<commit_message>
Update Dye Kinetics H2O2 vs mCPBA vs LiBH4 analysis.pptx
added slide for 10-11-22 experiment for filter settings
</commit_message>
<xml_diff>
--- a/experiments/10-11-22 h2o2 libh4 mcpba final kinetics/Dye Kinetics H2O2 vs mCPBA vs LiBH4 analysis.pptx
+++ b/experiments/10-11-22 h2o2 libh4 mcpba final kinetics/Dye Kinetics H2O2 vs mCPBA vs LiBH4 analysis.pptx
@@ -9,8 +9,9 @@
     <p:sldId id="257" r:id="rId3"/>
     <p:sldId id="258" r:id="rId4"/>
     <p:sldId id="259" r:id="rId5"/>
-    <p:sldId id="260" r:id="rId6"/>
-    <p:sldId id="261" r:id="rId7"/>
+    <p:sldId id="262" r:id="rId6"/>
+    <p:sldId id="260" r:id="rId7"/>
+    <p:sldId id="261" r:id="rId8"/>
   </p:sldIdLst>
   <p:sldSz cx="12192000" cy="6858000"/>
   <p:notesSz cx="6858000" cy="9144000"/>
@@ -109,6 +110,11 @@
       </a:defRPr>
     </a:lvl9pPr>
   </p:defaultTextStyle>
+  <p:extLst>
+    <p:ext uri="{EFAFB233-063F-42B5-8137-9DF3F51BA10A}">
+      <p15:sldGuideLst xmlns:p15="http://schemas.microsoft.com/office/powerpoint/2012/main"/>
+    </p:ext>
+  </p:extLst>
 </p:presentation>
 </file>
 
@@ -259,7 +265,7 @@
           <a:p>
             <a:fld id="{75E124A5-B177-4D3B-93D7-174B22EADCDC}" type="datetimeFigureOut">
               <a:rPr lang="en-US" smtClean="0"/>
-              <a:t>10/11/2022</a:t>
+              <a:t>10/12/2022</a:t>
             </a:fld>
             <a:endParaRPr lang="en-US"/>
           </a:p>
@@ -457,7 +463,7 @@
           <a:p>
             <a:fld id="{75E124A5-B177-4D3B-93D7-174B22EADCDC}" type="datetimeFigureOut">
               <a:rPr lang="en-US" smtClean="0"/>
-              <a:t>10/11/2022</a:t>
+              <a:t>10/12/2022</a:t>
             </a:fld>
             <a:endParaRPr lang="en-US"/>
           </a:p>
@@ -665,7 +671,7 @@
           <a:p>
             <a:fld id="{75E124A5-B177-4D3B-93D7-174B22EADCDC}" type="datetimeFigureOut">
               <a:rPr lang="en-US" smtClean="0"/>
-              <a:t>10/11/2022</a:t>
+              <a:t>10/12/2022</a:t>
             </a:fld>
             <a:endParaRPr lang="en-US"/>
           </a:p>
@@ -863,7 +869,7 @@
           <a:p>
             <a:fld id="{75E124A5-B177-4D3B-93D7-174B22EADCDC}" type="datetimeFigureOut">
               <a:rPr lang="en-US" smtClean="0"/>
-              <a:t>10/11/2022</a:t>
+              <a:t>10/12/2022</a:t>
             </a:fld>
             <a:endParaRPr lang="en-US"/>
           </a:p>
@@ -1138,7 +1144,7 @@
           <a:p>
             <a:fld id="{75E124A5-B177-4D3B-93D7-174B22EADCDC}" type="datetimeFigureOut">
               <a:rPr lang="en-US" smtClean="0"/>
-              <a:t>10/11/2022</a:t>
+              <a:t>10/12/2022</a:t>
             </a:fld>
             <a:endParaRPr lang="en-US"/>
           </a:p>
@@ -1403,7 +1409,7 @@
           <a:p>
             <a:fld id="{75E124A5-B177-4D3B-93D7-174B22EADCDC}" type="datetimeFigureOut">
               <a:rPr lang="en-US" smtClean="0"/>
-              <a:t>10/11/2022</a:t>
+              <a:t>10/12/2022</a:t>
             </a:fld>
             <a:endParaRPr lang="en-US"/>
           </a:p>
@@ -1815,7 +1821,7 @@
           <a:p>
             <a:fld id="{75E124A5-B177-4D3B-93D7-174B22EADCDC}" type="datetimeFigureOut">
               <a:rPr lang="en-US" smtClean="0"/>
-              <a:t>10/11/2022</a:t>
+              <a:t>10/12/2022</a:t>
             </a:fld>
             <a:endParaRPr lang="en-US"/>
           </a:p>
@@ -1956,7 +1962,7 @@
           <a:p>
             <a:fld id="{75E124A5-B177-4D3B-93D7-174B22EADCDC}" type="datetimeFigureOut">
               <a:rPr lang="en-US" smtClean="0"/>
-              <a:t>10/11/2022</a:t>
+              <a:t>10/12/2022</a:t>
             </a:fld>
             <a:endParaRPr lang="en-US"/>
           </a:p>
@@ -2069,7 +2075,7 @@
           <a:p>
             <a:fld id="{75E124A5-B177-4D3B-93D7-174B22EADCDC}" type="datetimeFigureOut">
               <a:rPr lang="en-US" smtClean="0"/>
-              <a:t>10/11/2022</a:t>
+              <a:t>10/12/2022</a:t>
             </a:fld>
             <a:endParaRPr lang="en-US"/>
           </a:p>
@@ -2380,7 +2386,7 @@
           <a:p>
             <a:fld id="{75E124A5-B177-4D3B-93D7-174B22EADCDC}" type="datetimeFigureOut">
               <a:rPr lang="en-US" smtClean="0"/>
-              <a:t>10/11/2022</a:t>
+              <a:t>10/12/2022</a:t>
             </a:fld>
             <a:endParaRPr lang="en-US"/>
           </a:p>
@@ -2668,7 +2674,7 @@
           <a:p>
             <a:fld id="{75E124A5-B177-4D3B-93D7-174B22EADCDC}" type="datetimeFigureOut">
               <a:rPr lang="en-US" smtClean="0"/>
-              <a:t>10/11/2022</a:t>
+              <a:t>10/12/2022</a:t>
             </a:fld>
             <a:endParaRPr lang="en-US"/>
           </a:p>
@@ -2909,7 +2915,7 @@
           <a:p>
             <a:fld id="{75E124A5-B177-4D3B-93D7-174B22EADCDC}" type="datetimeFigureOut">
               <a:rPr lang="en-US" smtClean="0"/>
-              <a:t>10/11/2022</a:t>
+              <a:t>10/12/2022</a:t>
             </a:fld>
             <a:endParaRPr lang="en-US"/>
           </a:p>
@@ -3985,6 +3991,101 @@
           <p:cNvPr id="2" name="Title 1">
             <a:extLst>
               <a:ext uri="{FF2B5EF4-FFF2-40B4-BE49-F238E27FC236}">
+                <a16:creationId xmlns:a16="http://schemas.microsoft.com/office/drawing/2014/main" id="{174B7013-C611-41CA-A095-FB9B44A09394}"/>
+              </a:ext>
+            </a:extLst>
+          </p:cNvPr>
+          <p:cNvSpPr>
+            <a:spLocks noGrp="1"/>
+          </p:cNvSpPr>
+          <p:nvPr>
+            <p:ph type="title"/>
+          </p:nvPr>
+        </p:nvSpPr>
+        <p:spPr>
+          <a:xfrm>
+            <a:off x="191218" y="0"/>
+            <a:ext cx="10515600" cy="540649"/>
+          </a:xfrm>
+        </p:spPr>
+        <p:txBody>
+          <a:bodyPr>
+            <a:normAutofit fontScale="90000"/>
+          </a:bodyPr>
+          <a:lstStyle/>
+          <a:p>
+            <a:r>
+              <a:rPr lang="en-US" dirty="0"/>
+              <a:t>Filter/Settings each Dye</a:t>
+            </a:r>
+          </a:p>
+        </p:txBody>
+      </p:sp>
+      <p:sp>
+        <p:nvSpPr>
+          <p:cNvPr id="3" name="Content Placeholder 2">
+            <a:extLst>
+              <a:ext uri="{FF2B5EF4-FFF2-40B4-BE49-F238E27FC236}">
+                <a16:creationId xmlns:a16="http://schemas.microsoft.com/office/drawing/2014/main" id="{5E02C94D-E704-91E0-33A0-8685C5777DB6}"/>
+              </a:ext>
+            </a:extLst>
+          </p:cNvPr>
+          <p:cNvSpPr>
+            <a:spLocks noGrp="1"/>
+          </p:cNvSpPr>
+          <p:nvPr>
+            <p:ph idx="1"/>
+          </p:nvPr>
+        </p:nvSpPr>
+        <p:spPr>
+          <a:xfrm>
+            <a:off x="355120" y="850839"/>
+            <a:ext cx="11583837" cy="5731115"/>
+          </a:xfrm>
+        </p:spPr>
+        <p:txBody>
+          <a:bodyPr/>
+          <a:lstStyle/>
+          <a:p>
+            <a:endParaRPr lang="en-US"/>
+          </a:p>
+        </p:txBody>
+      </p:sp>
+    </p:spTree>
+    <p:extLst>
+      <p:ext uri="{BB962C8B-B14F-4D97-AF65-F5344CB8AC3E}">
+        <p14:creationId xmlns:p14="http://schemas.microsoft.com/office/powerpoint/2010/main" val="2621581583"/>
+      </p:ext>
+    </p:extLst>
+  </p:cSld>
+  <p:clrMapOvr>
+    <a:masterClrMapping/>
+  </p:clrMapOvr>
+</p:sld>
+</file>
+
+<file path=ppt/slides/slide6.xml><?xml version="1.0" encoding="utf-8"?>
+<p:sld xmlns:a="http://schemas.openxmlformats.org/drawingml/2006/main" xmlns:r="http://schemas.openxmlformats.org/officeDocument/2006/relationships" xmlns:p="http://schemas.openxmlformats.org/presentationml/2006/main">
+  <p:cSld>
+    <p:spTree>
+      <p:nvGrpSpPr>
+        <p:cNvPr id="1" name=""/>
+        <p:cNvGrpSpPr/>
+        <p:nvPr/>
+      </p:nvGrpSpPr>
+      <p:grpSpPr>
+        <a:xfrm>
+          <a:off x="0" y="0"/>
+          <a:ext cx="0" cy="0"/>
+          <a:chOff x="0" y="0"/>
+          <a:chExt cx="0" cy="0"/>
+        </a:xfrm>
+      </p:grpSpPr>
+      <p:sp>
+        <p:nvSpPr>
+          <p:cNvPr id="2" name="Title 1">
+            <a:extLst>
+              <a:ext uri="{FF2B5EF4-FFF2-40B4-BE49-F238E27FC236}">
                 <a16:creationId xmlns:a16="http://schemas.microsoft.com/office/drawing/2014/main" id="{FA8A0020-EFEB-6BBC-1905-2AFB5FBE894E}"/>
               </a:ext>
             </a:extLst>
@@ -4092,10 +4193,10 @@
         </p:nvGrpSpPr>
         <p:grpSpPr>
           <a:xfrm rot="16200000">
-            <a:off x="3661957" y="3977449"/>
-            <a:ext cx="2613804" cy="378939"/>
+            <a:off x="3661963" y="3977449"/>
+            <a:ext cx="2613804" cy="378945"/>
             <a:chOff x="1897811" y="793630"/>
-            <a:chExt cx="2613804" cy="378939"/>
+            <a:chExt cx="2613804" cy="378945"/>
           </a:xfrm>
         </p:grpSpPr>
         <p:sp>
@@ -4164,8 +4265,8 @@
           </p:nvSpPr>
           <p:spPr>
             <a:xfrm>
-              <a:off x="2541326" y="803237"/>
-              <a:ext cx="1326773" cy="369332"/>
+              <a:off x="2127754" y="803243"/>
+              <a:ext cx="2153923" cy="369332"/>
             </a:xfrm>
             <a:prstGeom prst="rect">
               <a:avLst/>
@@ -4180,7 +4281,7 @@
             <a:p>
               <a:r>
                 <a:rPr lang="en-US" dirty="0"/>
-                <a:t>No Reaction</a:t>
+                <a:t>No Significant Bleach</a:t>
               </a:r>
             </a:p>
           </p:txBody>
@@ -4272,8 +4373,8 @@
           </p:nvSpPr>
           <p:spPr>
             <a:xfrm>
-              <a:off x="2541326" y="803237"/>
-              <a:ext cx="1326773" cy="369332"/>
+              <a:off x="2127751" y="803237"/>
+              <a:ext cx="2153923" cy="369332"/>
             </a:xfrm>
             <a:prstGeom prst="rect">
               <a:avLst/>
@@ -4288,7 +4389,7 @@
             <a:p>
               <a:r>
                 <a:rPr lang="en-US" dirty="0"/>
-                <a:t>No Reaction</a:t>
+                <a:t>No Significant Bleach</a:t>
               </a:r>
             </a:p>
           </p:txBody>
@@ -4380,8 +4481,8 @@
           </p:nvSpPr>
           <p:spPr>
             <a:xfrm>
-              <a:off x="2541326" y="803237"/>
-              <a:ext cx="1326773" cy="369332"/>
+              <a:off x="2127751" y="803237"/>
+              <a:ext cx="2153923" cy="369332"/>
             </a:xfrm>
             <a:prstGeom prst="rect">
               <a:avLst/>
@@ -4396,7 +4497,7 @@
             <a:p>
               <a:r>
                 <a:rPr lang="en-US" dirty="0"/>
-                <a:t>No Reaction</a:t>
+                <a:t>No Significant Bleach</a:t>
               </a:r>
             </a:p>
           </p:txBody>
@@ -4415,7 +4516,7 @@
 </p:sld>
 </file>
 
-<file path=ppt/slides/slide6.xml><?xml version="1.0" encoding="utf-8"?>
+<file path=ppt/slides/slide7.xml><?xml version="1.0" encoding="utf-8"?>
 <p:sld xmlns:a="http://schemas.openxmlformats.org/drawingml/2006/main" xmlns:r="http://schemas.openxmlformats.org/officeDocument/2006/relationships" xmlns:p="http://schemas.openxmlformats.org/presentationml/2006/main">
   <p:cSld>
     <p:spTree>

</xml_diff>